<commit_message>
Updated slides (added new survey links)
</commit_message>
<xml_diff>
--- a/Slides/Git-Novice.pptx
+++ b/Slides/Git-Novice.pptx
@@ -274,7 +274,7 @@
           <a:p>
             <a:fld id="{34732847-077D-164F-AEE6-BF90D94B4901}" type="datetimeFigureOut">
               <a:rPr lang="en-US" smtClean="0"/>
-              <a:t>12/1/2023</a:t>
+              <a:t>1/10/2024</a:t>
             </a:fld>
             <a:endParaRPr lang="en-US"/>
           </a:p>
@@ -4001,7 +4001,7 @@
           <a:p>
             <a:fld id="{6AD6EE87-EBD5-4F12-A48A-63ACA297AC8F}" type="datetimeFigureOut">
               <a:rPr lang="en-US" smtClean="0"/>
-              <a:t>12/1/2023</a:t>
+              <a:t>1/10/2024</a:t>
             </a:fld>
             <a:endParaRPr lang="en-US" dirty="0"/>
           </a:p>
@@ -4176,7 +4176,7 @@
           <a:p>
             <a:fld id="{4CD73815-2707-4475-8F1A-B873CB631BB4}" type="datetimeFigureOut">
               <a:rPr lang="en-US" smtClean="0"/>
-              <a:t>12/1/2023</a:t>
+              <a:t>1/10/2024</a:t>
             </a:fld>
             <a:endParaRPr lang="en-US" dirty="0"/>
           </a:p>
@@ -4356,7 +4356,7 @@
           <a:p>
             <a:fld id="{2A4AFB99-0EAB-4182-AFF8-E214C82A68F6}" type="datetimeFigureOut">
               <a:rPr lang="en-US" smtClean="0"/>
-              <a:t>12/1/2023</a:t>
+              <a:t>1/10/2024</a:t>
             </a:fld>
             <a:endParaRPr lang="en-US" dirty="0"/>
           </a:p>
@@ -4531,7 +4531,7 @@
           <a:p>
             <a:fld id="{A5D3794B-289A-4A80-97D7-111025398D45}" type="datetimeFigureOut">
               <a:rPr lang="en-US" smtClean="0"/>
-              <a:t>12/1/2023</a:t>
+              <a:t>1/10/2024</a:t>
             </a:fld>
             <a:endParaRPr lang="en-US" dirty="0"/>
           </a:p>
@@ -4799,7 +4799,7 @@
           <a:p>
             <a:fld id="{5A61015F-7CC6-4D0A-9D87-873EA4C304CC}" type="datetimeFigureOut">
               <a:rPr lang="en-US" smtClean="0"/>
-              <a:t>12/1/2023</a:t>
+              <a:t>1/10/2024</a:t>
             </a:fld>
             <a:endParaRPr lang="en-US" dirty="0"/>
           </a:p>
@@ -5035,7 +5035,7 @@
           <a:p>
             <a:fld id="{93C6A301-0538-44EC-B09D-202E1042A48B}" type="datetimeFigureOut">
               <a:rPr lang="en-US" smtClean="0"/>
-              <a:t>12/1/2023</a:t>
+              <a:t>1/10/2024</a:t>
             </a:fld>
             <a:endParaRPr lang="en-US" dirty="0"/>
           </a:p>
@@ -5394,7 +5394,7 @@
           <a:p>
             <a:fld id="{D789574A-8875-45EF-8EA2-3CAA0F7ABC4C}" type="datetimeFigureOut">
               <a:rPr lang="en-US" smtClean="0"/>
-              <a:t>12/1/2023</a:t>
+              <a:t>1/10/2024</a:t>
             </a:fld>
             <a:endParaRPr lang="en-US" dirty="0"/>
           </a:p>
@@ -5545,7 +5545,7 @@
           <a:p>
             <a:fld id="{67EF4D4C-5367-4C26-9E2B-D8088D7FCA81}" type="datetimeFigureOut">
               <a:rPr lang="en-US" smtClean="0"/>
-              <a:t>12/1/2023</a:t>
+              <a:t>1/10/2024</a:t>
             </a:fld>
             <a:endParaRPr lang="en-US" dirty="0"/>
           </a:p>
@@ -5640,7 +5640,7 @@
           <a:p>
             <a:fld id="{56E91E96-98B0-4413-9547-46F3504108EF}" type="datetimeFigureOut">
               <a:rPr lang="en-US" smtClean="0"/>
-              <a:t>12/1/2023</a:t>
+              <a:t>1/10/2024</a:t>
             </a:fld>
             <a:endParaRPr lang="en-US" dirty="0"/>
           </a:p>
@@ -5997,7 +5997,7 @@
           <a:p>
             <a:fld id="{05C68B11-C5A8-448C-8CE9-B1A273C79CFC}" type="datetimeFigureOut">
               <a:rPr lang="en-US" smtClean="0"/>
-              <a:t>12/1/2023</a:t>
+              <a:t>1/10/2024</a:t>
             </a:fld>
             <a:endParaRPr lang="en-US" dirty="0"/>
           </a:p>
@@ -6354,7 +6354,7 @@
           <a:p>
             <a:fld id="{C7616CA0-919D-4A49-9C8A-62FDFB3A5183}" type="datetimeFigureOut">
               <a:rPr lang="en-US" smtClean="0"/>
-              <a:t>12/1/2023</a:t>
+              <a:t>1/10/2024</a:t>
             </a:fld>
             <a:endParaRPr lang="en-US" dirty="0"/>
           </a:p>
@@ -6596,7 +6596,7 @@
             <a:fld id="{90298CD5-6C1E-4009-B41F-6DF62E31D3BE}" type="datetimeFigureOut">
               <a:rPr lang="en-US" smtClean="0"/>
               <a:pPr/>
-              <a:t>12/1/2023</a:t>
+              <a:t>1/10/2024</a:t>
             </a:fld>
             <a:endParaRPr lang="en-US" dirty="0"/>
           </a:p>
@@ -7067,16 +7067,28 @@
         </p:nvSpPr>
         <p:spPr/>
         <p:txBody>
-          <a:bodyPr/>
+          <a:bodyPr>
+            <a:normAutofit fontScale="90000"/>
+          </a:bodyPr>
           <a:lstStyle/>
           <a:p>
             <a:r>
               <a:rPr lang="en-US" dirty="0"/>
-              <a:t>AN INTRODUCTION TO </a:t>
-            </a:r>
+              <a:t>INTRODUCTION </a:t>
+            </a:r>
+            <a:br>
+              <a:rPr lang="en-US" dirty="0"/>
+            </a:br>
+            <a:r>
+              <a:rPr lang="en-US" dirty="0"/>
+              <a:t>TO </a:t>
+            </a:r>
+            <a:br>
+              <a:rPr lang="en-US" dirty="0"/>
+            </a:br>
             <a:r>
               <a:rPr lang="en-GB" dirty="0"/>
-              <a:t>GiT</a:t>
+              <a:t>Version control</a:t>
             </a:r>
           </a:p>
         </p:txBody>
@@ -8817,7 +8829,7 @@
               <a:rPr lang="en-GB" sz="3600" dirty="0">
                 <a:hlinkClick r:id="rId3"/>
               </a:rPr>
-              <a:t>https://leicester.onlinesurveys.ac.uk/sdcct101ivc2018v01</a:t>
+              <a:t>https://app.onlinesurveys.jisc.ac.uk/s/leicester/introduction-to-version-control</a:t>
             </a:r>
             <a:endParaRPr lang="en-GB" sz="3600" dirty="0"/>
           </a:p>
@@ -8835,15 +8847,17 @@
               <a:buNone/>
             </a:pPr>
             <a:r>
-              <a:rPr lang="en-GB" sz="4800" dirty="0">
+              <a:rPr lang="en-GB" sz="3600" dirty="0">
                 <a:hlinkClick r:id="rId4"/>
               </a:rPr>
-              <a:t>https://tinyurl.com/ycrtjzes</a:t>
-            </a:r>
-            <a:endParaRPr lang="en-US" sz="4800" dirty="0"/>
-          </a:p>
-          <a:p>
-            <a:pPr algn="ctr"/>
+              <a:t>https://bit.ly/uolrcsivc</a:t>
+            </a:r>
+            <a:endParaRPr lang="en-GB" sz="3600" dirty="0"/>
+          </a:p>
+          <a:p>
+            <a:pPr marL="0" indent="0" algn="ctr">
+              <a:buNone/>
+            </a:pPr>
             <a:endParaRPr lang="en-GB" sz="3600" dirty="0"/>
           </a:p>
         </p:txBody>

</xml_diff>